<commit_message>
Corrected typos in slides
</commit_message>
<xml_diff>
--- a/slides/9_SocialNetworkAnalysis.pptx
+++ b/slides/9_SocialNetworkAnalysis.pptx
@@ -238,7 +238,7 @@
           <a:p>
             <a:fld id="{D0D7D09A-089B-49AD-9380-9EDF59B0FA35}" type="datetimeFigureOut">
               <a:rPr lang="en-US" smtClean="0"/>
-              <a:t>7/28/2021</a:t>
+              <a:t>7/30/2021</a:t>
             </a:fld>
             <a:endParaRPr lang="en-US"/>
           </a:p>
@@ -652,7 +652,7 @@
           <a:p>
             <a:fld id="{66F7C53C-E5B1-464F-8287-06D868EDC1EC}" type="datetimeFigureOut">
               <a:rPr lang="en-US" smtClean="0"/>
-              <a:t>7/28/2021</a:t>
+              <a:t>7/30/2021</a:t>
             </a:fld>
             <a:endParaRPr lang="en-US"/>
           </a:p>
@@ -850,7 +850,7 @@
           <a:p>
             <a:fld id="{66F7C53C-E5B1-464F-8287-06D868EDC1EC}" type="datetimeFigureOut">
               <a:rPr lang="en-US" smtClean="0"/>
-              <a:t>7/28/2021</a:t>
+              <a:t>7/30/2021</a:t>
             </a:fld>
             <a:endParaRPr lang="en-US"/>
           </a:p>
@@ -1058,7 +1058,7 @@
           <a:p>
             <a:fld id="{66F7C53C-E5B1-464F-8287-06D868EDC1EC}" type="datetimeFigureOut">
               <a:rPr lang="en-US" smtClean="0"/>
-              <a:t>7/28/2021</a:t>
+              <a:t>7/30/2021</a:t>
             </a:fld>
             <a:endParaRPr lang="en-US"/>
           </a:p>
@@ -1256,7 +1256,7 @@
           <a:p>
             <a:fld id="{66F7C53C-E5B1-464F-8287-06D868EDC1EC}" type="datetimeFigureOut">
               <a:rPr lang="en-US" smtClean="0"/>
-              <a:t>7/28/2021</a:t>
+              <a:t>7/30/2021</a:t>
             </a:fld>
             <a:endParaRPr lang="en-US"/>
           </a:p>
@@ -1531,7 +1531,7 @@
           <a:p>
             <a:fld id="{66F7C53C-E5B1-464F-8287-06D868EDC1EC}" type="datetimeFigureOut">
               <a:rPr lang="en-US" smtClean="0"/>
-              <a:t>7/28/2021</a:t>
+              <a:t>7/30/2021</a:t>
             </a:fld>
             <a:endParaRPr lang="en-US"/>
           </a:p>
@@ -1796,7 +1796,7 @@
           <a:p>
             <a:fld id="{66F7C53C-E5B1-464F-8287-06D868EDC1EC}" type="datetimeFigureOut">
               <a:rPr lang="en-US" smtClean="0"/>
-              <a:t>7/28/2021</a:t>
+              <a:t>7/30/2021</a:t>
             </a:fld>
             <a:endParaRPr lang="en-US"/>
           </a:p>
@@ -2208,7 +2208,7 @@
           <a:p>
             <a:fld id="{66F7C53C-E5B1-464F-8287-06D868EDC1EC}" type="datetimeFigureOut">
               <a:rPr lang="en-US" smtClean="0"/>
-              <a:t>7/28/2021</a:t>
+              <a:t>7/30/2021</a:t>
             </a:fld>
             <a:endParaRPr lang="en-US"/>
           </a:p>
@@ -2349,7 +2349,7 @@
           <a:p>
             <a:fld id="{66F7C53C-E5B1-464F-8287-06D868EDC1EC}" type="datetimeFigureOut">
               <a:rPr lang="en-US" smtClean="0"/>
-              <a:t>7/28/2021</a:t>
+              <a:t>7/30/2021</a:t>
             </a:fld>
             <a:endParaRPr lang="en-US"/>
           </a:p>
@@ -2462,7 +2462,7 @@
           <a:p>
             <a:fld id="{66F7C53C-E5B1-464F-8287-06D868EDC1EC}" type="datetimeFigureOut">
               <a:rPr lang="en-US" smtClean="0"/>
-              <a:t>7/28/2021</a:t>
+              <a:t>7/30/2021</a:t>
             </a:fld>
             <a:endParaRPr lang="en-US"/>
           </a:p>
@@ -2773,7 +2773,7 @@
           <a:p>
             <a:fld id="{66F7C53C-E5B1-464F-8287-06D868EDC1EC}" type="datetimeFigureOut">
               <a:rPr lang="en-US" smtClean="0"/>
-              <a:t>7/28/2021</a:t>
+              <a:t>7/30/2021</a:t>
             </a:fld>
             <a:endParaRPr lang="en-US"/>
           </a:p>
@@ -3061,7 +3061,7 @@
           <a:p>
             <a:fld id="{66F7C53C-E5B1-464F-8287-06D868EDC1EC}" type="datetimeFigureOut">
               <a:rPr lang="en-US" smtClean="0"/>
-              <a:t>7/28/2021</a:t>
+              <a:t>7/30/2021</a:t>
             </a:fld>
             <a:endParaRPr lang="en-US"/>
           </a:p>
@@ -3302,7 +3302,7 @@
           <a:p>
             <a:fld id="{66F7C53C-E5B1-464F-8287-06D868EDC1EC}" type="datetimeFigureOut">
               <a:rPr lang="en-US" smtClean="0"/>
-              <a:t>7/28/2021</a:t>
+              <a:t>7/30/2021</a:t>
             </a:fld>
             <a:endParaRPr lang="en-US"/>
           </a:p>
@@ -4142,8 +4142,8 @@
           </a:p>
         </p:txBody>
       </p:sp>
-      <mc:AlternateContent xmlns:mc="http://schemas.openxmlformats.org/markup-compatibility/2006" xmlns:a14="http://schemas.microsoft.com/office/drawing/2010/main">
-        <mc:Choice Requires="a14">
+      <mc:AlternateContent xmlns:mc="http://schemas.openxmlformats.org/markup-compatibility/2006">
+        <mc:Choice xmlns:a14="http://schemas.microsoft.com/office/drawing/2010/main" Requires="a14">
           <p:sp>
             <p:nvSpPr>
               <p:cNvPr id="3" name="Content Placeholder 2">
@@ -4191,7 +4191,7 @@
                 </a:r>
                 <a:r>
                   <a:rPr lang="en-US" dirty="0"/>
-                  <a:t>is the average distance from a node to all other nodes in a graph component </a:t>
+                  <a:t>is the average inverse distance from a node to all other nodes in a graph component </a:t>
                 </a:r>
               </a:p>
               <a:p>
@@ -4460,7 +4460,7 @@
             </p:txBody>
           </p:sp>
         </mc:Choice>
-        <mc:Fallback xmlns="">
+        <mc:Fallback>
           <p:sp>
             <p:nvSpPr>
               <p:cNvPr id="3" name="Content Placeholder 2">
@@ -4485,7 +4485,7 @@
               <a:blipFill>
                 <a:blip r:embed="rId2"/>
                 <a:stretch>
-                  <a:fillRect l="-1159" t="-1790"/>
+                  <a:fillRect l="-1159" t="-1790" r="-1333"/>
                 </a:stretch>
               </a:blipFill>
             </p:spPr>
@@ -36477,235 +36477,6 @@
                 </a14:m>
                 <a:endParaRPr lang="en-US" dirty="0"/>
               </a:p>
-              <a:p>
-                <a:r>
-                  <a:rPr lang="en-US" dirty="0"/>
-                  <a:t>The constrained problem is then:  </a:t>
-                </a:r>
-              </a:p>
-              <a:p>
-                <a:pPr marL="0" indent="0">
-                  <a:buNone/>
-                </a:pPr>
-                <a14:m>
-                  <m:oMathPara xmlns:m="http://schemas.openxmlformats.org/officeDocument/2006/math">
-                    <m:oMathParaPr>
-                      <m:jc m:val="centerGroup"/>
-                    </m:oMathParaPr>
-                    <m:oMath xmlns:m="http://schemas.openxmlformats.org/officeDocument/2006/math">
-                      <m:func>
-                        <m:funcPr>
-                          <m:ctrlPr>
-                            <a:rPr lang="en-US" i="1" smtClean="0">
-                              <a:latin typeface="Cambria Math" panose="02040503050406030204" pitchFamily="18" charset="0"/>
-                            </a:rPr>
-                          </m:ctrlPr>
-                        </m:funcPr>
-                        <m:fName>
-                          <m:limLow>
-                            <m:limLowPr>
-                              <m:ctrlPr>
-                                <a:rPr lang="en-US" i="1" smtClean="0">
-                                  <a:latin typeface="Cambria Math" panose="02040503050406030204" pitchFamily="18" charset="0"/>
-                                </a:rPr>
-                              </m:ctrlPr>
-                            </m:limLowPr>
-                            <m:e>
-                              <m:r>
-                                <m:rPr>
-                                  <m:sty m:val="p"/>
-                                </m:rPr>
-                                <a:rPr lang="en-US" i="0" smtClean="0">
-                                  <a:latin typeface="Cambria Math" panose="02040503050406030204" pitchFamily="18" charset="0"/>
-                                </a:rPr>
-                                <m:t>max</m:t>
-                              </m:r>
-                            </m:e>
-                            <m:lim>
-                              <m:r>
-                                <a:rPr lang="en-US" b="0" i="1" smtClean="0">
-                                  <a:latin typeface="Cambria Math" panose="02040503050406030204" pitchFamily="18" charset="0"/>
-                                </a:rPr>
-                                <m:t>𝑠</m:t>
-                              </m:r>
-                            </m:lim>
-                          </m:limLow>
-                        </m:fName>
-                        <m:e>
-                          <m:f>
-                            <m:fPr>
-                              <m:ctrlPr>
-                                <a:rPr lang="en-US" i="1">
-                                  <a:latin typeface="Cambria Math" panose="02040503050406030204" pitchFamily="18" charset="0"/>
-                                </a:rPr>
-                              </m:ctrlPr>
-                            </m:fPr>
-                            <m:num>
-                              <m:r>
-                                <a:rPr lang="en-US" i="1">
-                                  <a:latin typeface="Cambria Math" panose="02040503050406030204" pitchFamily="18" charset="0"/>
-                                </a:rPr>
-                                <m:t>1</m:t>
-                              </m:r>
-                            </m:num>
-                            <m:den>
-                              <m:r>
-                                <a:rPr lang="en-US" i="1">
-                                  <a:latin typeface="Cambria Math" panose="02040503050406030204" pitchFamily="18" charset="0"/>
-                                </a:rPr>
-                                <m:t>2</m:t>
-                              </m:r>
-                            </m:den>
-                          </m:f>
-                          <m:sSup>
-                            <m:sSupPr>
-                              <m:ctrlPr>
-                                <a:rPr lang="en-US" i="1">
-                                  <a:latin typeface="Cambria Math" panose="02040503050406030204" pitchFamily="18" charset="0"/>
-                                </a:rPr>
-                              </m:ctrlPr>
-                            </m:sSupPr>
-                            <m:e>
-                              <m:r>
-                                <a:rPr lang="en-US" i="1">
-                                  <a:latin typeface="Cambria Math" panose="02040503050406030204" pitchFamily="18" charset="0"/>
-                                </a:rPr>
-                                <m:t>𝑠</m:t>
-                              </m:r>
-                            </m:e>
-                            <m:sup>
-                              <m:r>
-                                <a:rPr lang="en-US" i="1">
-                                  <a:latin typeface="Cambria Math" panose="02040503050406030204" pitchFamily="18" charset="0"/>
-                                </a:rPr>
-                                <m:t>𝑇</m:t>
-                              </m:r>
-                            </m:sup>
-                          </m:sSup>
-                          <m:r>
-                            <a:rPr lang="en-US" i="1">
-                              <a:latin typeface="Cambria Math" panose="02040503050406030204" pitchFamily="18" charset="0"/>
-                            </a:rPr>
-                            <m:t>𝐵𝑠</m:t>
-                          </m:r>
-                        </m:e>
-                      </m:func>
-                      <m:r>
-                        <a:rPr lang="en-US" b="0" i="1" smtClean="0">
-                          <a:latin typeface="Cambria Math" panose="02040503050406030204" pitchFamily="18" charset="0"/>
-                        </a:rPr>
-                        <m:t>−</m:t>
-                      </m:r>
-                      <m:r>
-                        <a:rPr lang="en-US" b="0" i="1" smtClean="0">
-                          <a:latin typeface="Cambria Math" panose="02040503050406030204" pitchFamily="18" charset="0"/>
-                          <a:ea typeface="Cambria Math" panose="02040503050406030204" pitchFamily="18" charset="0"/>
-                        </a:rPr>
-                        <m:t>𝜆</m:t>
-                      </m:r>
-                      <m:sSup>
-                        <m:sSupPr>
-                          <m:ctrlPr>
-                            <a:rPr lang="en-US" i="1">
-                              <a:latin typeface="Cambria Math" panose="02040503050406030204" pitchFamily="18" charset="0"/>
-                            </a:rPr>
-                          </m:ctrlPr>
-                        </m:sSupPr>
-                        <m:e>
-                          <m:r>
-                            <a:rPr lang="en-US" i="1">
-                              <a:latin typeface="Cambria Math" panose="02040503050406030204" pitchFamily="18" charset="0"/>
-                            </a:rPr>
-                            <m:t>𝑠</m:t>
-                          </m:r>
-                        </m:e>
-                        <m:sup>
-                          <m:r>
-                            <a:rPr lang="en-US" i="1">
-                              <a:latin typeface="Cambria Math" panose="02040503050406030204" pitchFamily="18" charset="0"/>
-                            </a:rPr>
-                            <m:t>𝑇</m:t>
-                          </m:r>
-                        </m:sup>
-                      </m:sSup>
-                      <m:r>
-                        <a:rPr lang="en-US" i="1">
-                          <a:latin typeface="Cambria Math" panose="02040503050406030204" pitchFamily="18" charset="0"/>
-                        </a:rPr>
-                        <m:t>𝑠</m:t>
-                      </m:r>
-                      <m:r>
-                        <a:rPr lang="en-US" b="0" i="1" smtClean="0">
-                          <a:latin typeface="Cambria Math" panose="02040503050406030204" pitchFamily="18" charset="0"/>
-                        </a:rPr>
-                        <m:t>,  </m:t>
-                      </m:r>
-                      <m:r>
-                        <a:rPr lang="en-US" b="0" i="1" smtClean="0">
-                          <a:latin typeface="Cambria Math" panose="02040503050406030204" pitchFamily="18" charset="0"/>
-                        </a:rPr>
-                        <m:t>𝑤h𝑒𝑟𝑒</m:t>
-                      </m:r>
-                      <m:r>
-                        <a:rPr lang="en-US" b="0" i="1" smtClean="0">
-                          <a:latin typeface="Cambria Math" panose="02040503050406030204" pitchFamily="18" charset="0"/>
-                        </a:rPr>
-                        <m:t> </m:t>
-                      </m:r>
-                      <m:r>
-                        <a:rPr lang="en-US" b="0" i="1" smtClean="0">
-                          <a:latin typeface="Cambria Math" panose="02040503050406030204" pitchFamily="18" charset="0"/>
-                          <a:ea typeface="Cambria Math" panose="02040503050406030204" pitchFamily="18" charset="0"/>
-                        </a:rPr>
-                        <m:t>𝜆</m:t>
-                      </m:r>
-                      <m:r>
-                        <a:rPr lang="en-US" b="0" i="1" smtClean="0">
-                          <a:latin typeface="Cambria Math" panose="02040503050406030204" pitchFamily="18" charset="0"/>
-                          <a:ea typeface="Cambria Math" panose="02040503050406030204" pitchFamily="18" charset="0"/>
-                        </a:rPr>
-                        <m:t> </m:t>
-                      </m:r>
-                      <m:r>
-                        <a:rPr lang="en-US" b="0" i="1" smtClean="0">
-                          <a:latin typeface="Cambria Math" panose="02040503050406030204" pitchFamily="18" charset="0"/>
-                          <a:ea typeface="Cambria Math" panose="02040503050406030204" pitchFamily="18" charset="0"/>
-                        </a:rPr>
-                        <m:t>𝑖𝑠</m:t>
-                      </m:r>
-                      <m:r>
-                        <a:rPr lang="en-US" b="0" i="1" smtClean="0">
-                          <a:latin typeface="Cambria Math" panose="02040503050406030204" pitchFamily="18" charset="0"/>
-                          <a:ea typeface="Cambria Math" panose="02040503050406030204" pitchFamily="18" charset="0"/>
-                        </a:rPr>
-                        <m:t> </m:t>
-                      </m:r>
-                      <m:r>
-                        <a:rPr lang="en-US" b="1" i="1" smtClean="0">
-                          <a:latin typeface="Cambria Math" panose="02040503050406030204" pitchFamily="18" charset="0"/>
-                          <a:ea typeface="Cambria Math" panose="02040503050406030204" pitchFamily="18" charset="0"/>
-                        </a:rPr>
-                        <m:t>𝑳𝒂𝒈𝒓𝒂𝒏𝒈𝒆</m:t>
-                      </m:r>
-                      <m:r>
-                        <a:rPr lang="en-US" b="1" i="1" smtClean="0">
-                          <a:latin typeface="Cambria Math" panose="02040503050406030204" pitchFamily="18" charset="0"/>
-                          <a:ea typeface="Cambria Math" panose="02040503050406030204" pitchFamily="18" charset="0"/>
-                        </a:rPr>
-                        <m:t> </m:t>
-                      </m:r>
-                      <m:r>
-                        <a:rPr lang="en-US" b="1" i="1" smtClean="0">
-                          <a:latin typeface="Cambria Math" panose="02040503050406030204" pitchFamily="18" charset="0"/>
-                          <a:ea typeface="Cambria Math" panose="02040503050406030204" pitchFamily="18" charset="0"/>
-                        </a:rPr>
-                        <m:t>𝒎𝒖𝒍𝒕𝒊𝒑𝒍𝒊𝒆𝒓</m:t>
-                      </m:r>
-                    </m:oMath>
-                  </m:oMathPara>
-                </a14:m>
-                <a:endParaRPr lang="en-US" b="1" dirty="0"/>
-              </a:p>
             </p:txBody>
           </p:sp>
         </mc:Choice>
@@ -37347,7 +37118,7 @@
             </p:spPr>
             <p:txBody>
               <a:bodyPr>
-                <a:normAutofit fontScale="92500"/>
+                <a:normAutofit fontScale="92500" lnSpcReduction="20000"/>
               </a:bodyPr>
               <a:lstStyle/>
               <a:p>
@@ -37417,113 +37188,246 @@
                           </m:limLow>
                         </m:fName>
                         <m:e>
-                          <m:f>
-                            <m:fPr>
+                          <m:nary>
+                            <m:naryPr>
+                              <m:chr m:val="∑"/>
+                              <m:supHide m:val="on"/>
                               <m:ctrlPr>
                                 <a:rPr lang="en-US" i="1">
                                   <a:latin typeface="Cambria Math" panose="02040503050406030204" pitchFamily="18" charset="0"/>
                                 </a:rPr>
                               </m:ctrlPr>
-                            </m:fPr>
-                            <m:num>
+                            </m:naryPr>
+                            <m:sub>
+                              <m:r>
+                                <m:rPr>
+                                  <m:brk m:alnAt="7"/>
+                                </m:rPr>
+                                <a:rPr lang="en-US" i="1">
+                                  <a:latin typeface="Cambria Math" panose="02040503050406030204" pitchFamily="18" charset="0"/>
+                                </a:rPr>
+                                <m:t>𝑗</m:t>
+                              </m:r>
                               <m:r>
                                 <a:rPr lang="en-US" i="1">
                                   <a:latin typeface="Cambria Math" panose="02040503050406030204" pitchFamily="18" charset="0"/>
                                 </a:rPr>
-                                <m:t>1</m:t>
+                                <m:t>,</m:t>
                               </m:r>
-                            </m:num>
-                            <m:den>
                               <m:r>
                                 <a:rPr lang="en-US" i="1">
                                   <a:latin typeface="Cambria Math" panose="02040503050406030204" pitchFamily="18" charset="0"/>
                                 </a:rPr>
-                                <m:t>2</m:t>
+                                <m:t>𝑘</m:t>
                               </m:r>
-                            </m:den>
-                          </m:f>
-                          <m:sSup>
-                            <m:sSupPr>
+                            </m:sub>
+                            <m:sup/>
+                            <m:e>
+                              <m:sSub>
+                                <m:sSubPr>
+                                  <m:ctrlPr>
+                                    <a:rPr lang="en-US" i="1">
+                                      <a:latin typeface="Cambria Math" panose="02040503050406030204" pitchFamily="18" charset="0"/>
+                                    </a:rPr>
+                                  </m:ctrlPr>
+                                </m:sSubPr>
+                                <m:e>
+                                  <m:r>
+                                    <a:rPr lang="en-US" i="1">
+                                      <a:latin typeface="Cambria Math" panose="02040503050406030204" pitchFamily="18" charset="0"/>
+                                    </a:rPr>
+                                    <m:t>𝐵</m:t>
+                                  </m:r>
+                                </m:e>
+                                <m:sub>
+                                  <m:r>
+                                    <a:rPr lang="en-US" i="1">
+                                      <a:latin typeface="Cambria Math" panose="02040503050406030204" pitchFamily="18" charset="0"/>
+                                    </a:rPr>
+                                    <m:t>𝑗</m:t>
+                                  </m:r>
+                                  <m:r>
+                                    <a:rPr lang="en-US" i="1">
+                                      <a:latin typeface="Cambria Math" panose="02040503050406030204" pitchFamily="18" charset="0"/>
+                                    </a:rPr>
+                                    <m:t>,</m:t>
+                                  </m:r>
+                                  <m:r>
+                                    <a:rPr lang="en-US" i="1">
+                                      <a:latin typeface="Cambria Math" panose="02040503050406030204" pitchFamily="18" charset="0"/>
+                                    </a:rPr>
+                                    <m:t>𝑘</m:t>
+                                  </m:r>
+                                </m:sub>
+                              </m:sSub>
+                              <m:sSub>
+                                <m:sSubPr>
+                                  <m:ctrlPr>
+                                    <a:rPr lang="en-US" i="1">
+                                      <a:latin typeface="Cambria Math" panose="02040503050406030204" pitchFamily="18" charset="0"/>
+                                    </a:rPr>
+                                  </m:ctrlPr>
+                                </m:sSubPr>
+                                <m:e>
+                                  <m:r>
+                                    <a:rPr lang="en-US" i="1">
+                                      <a:latin typeface="Cambria Math" panose="02040503050406030204" pitchFamily="18" charset="0"/>
+                                    </a:rPr>
+                                    <m:t>𝑠</m:t>
+                                  </m:r>
+                                </m:e>
+                                <m:sub>
+                                  <m:r>
+                                    <a:rPr lang="en-US" i="1">
+                                      <a:latin typeface="Cambria Math" panose="02040503050406030204" pitchFamily="18" charset="0"/>
+                                    </a:rPr>
+                                    <m:t>𝑗</m:t>
+                                  </m:r>
+                                </m:sub>
+                              </m:sSub>
+                              <m:sSub>
+                                <m:sSubPr>
+                                  <m:ctrlPr>
+                                    <a:rPr lang="en-US" i="1">
+                                      <a:latin typeface="Cambria Math" panose="02040503050406030204" pitchFamily="18" charset="0"/>
+                                    </a:rPr>
+                                  </m:ctrlPr>
+                                </m:sSubPr>
+                                <m:e>
+                                  <m:r>
+                                    <a:rPr lang="en-US" i="1">
+                                      <a:latin typeface="Cambria Math" panose="02040503050406030204" pitchFamily="18" charset="0"/>
+                                    </a:rPr>
+                                    <m:t>𝑠</m:t>
+                                  </m:r>
+                                </m:e>
+                                <m:sub>
+                                  <m:r>
+                                    <a:rPr lang="en-US" i="1">
+                                      <a:latin typeface="Cambria Math" panose="02040503050406030204" pitchFamily="18" charset="0"/>
+                                    </a:rPr>
+                                    <m:t>𝑘</m:t>
+                                  </m:r>
+                                </m:sub>
+                              </m:sSub>
+                              <m:r>
+                                <a:rPr lang="en-US" i="1">
+                                  <a:latin typeface="Cambria Math" panose="02040503050406030204" pitchFamily="18" charset="0"/>
+                                </a:rPr>
+                                <m:t>+</m:t>
+                              </m:r>
+                            </m:e>
+                          </m:nary>
+                          <m:r>
+                            <a:rPr lang="en-US" i="1">
+                              <a:latin typeface="Cambria Math" panose="02040503050406030204" pitchFamily="18" charset="0"/>
+                              <a:ea typeface="Cambria Math" panose="02040503050406030204" pitchFamily="18" charset="0"/>
+                            </a:rPr>
+                            <m:t>𝜆</m:t>
+                          </m:r>
+                          <m:d>
+                            <m:dPr>
                               <m:ctrlPr>
                                 <a:rPr lang="en-US" i="1">
                                   <a:latin typeface="Cambria Math" panose="02040503050406030204" pitchFamily="18" charset="0"/>
+                                  <a:ea typeface="Cambria Math" panose="02040503050406030204" pitchFamily="18" charset="0"/>
                                 </a:rPr>
                               </m:ctrlPr>
-                            </m:sSupPr>
+                            </m:dPr>
                             <m:e>
                               <m:r>
                                 <a:rPr lang="en-US" i="1">
                                   <a:latin typeface="Cambria Math" panose="02040503050406030204" pitchFamily="18" charset="0"/>
+                                  <a:ea typeface="Cambria Math" panose="02040503050406030204" pitchFamily="18" charset="0"/>
                                 </a:rPr>
-                                <m:t>𝑠</m:t>
+                                <m:t>𝑛</m:t>
                               </m:r>
-                            </m:e>
-                            <m:sup>
                               <m:r>
                                 <a:rPr lang="en-US" i="1">
                                   <a:latin typeface="Cambria Math" panose="02040503050406030204" pitchFamily="18" charset="0"/>
+                                  <a:ea typeface="Cambria Math" panose="02040503050406030204" pitchFamily="18" charset="0"/>
                                 </a:rPr>
-                                <m:t>𝑇</m:t>
+                                <m:t>−</m:t>
                               </m:r>
-                            </m:sup>
-                          </m:sSup>
-                          <m:r>
-                            <a:rPr lang="en-US" i="1">
-                              <a:latin typeface="Cambria Math" panose="02040503050406030204" pitchFamily="18" charset="0"/>
-                            </a:rPr>
-                            <m:t>𝐵𝑠</m:t>
-                          </m:r>
+                              <m:nary>
+                                <m:naryPr>
+                                  <m:chr m:val="∑"/>
+                                  <m:supHide m:val="on"/>
+                                  <m:ctrlPr>
+                                    <a:rPr lang="en-US" i="1">
+                                      <a:latin typeface="Cambria Math" panose="02040503050406030204" pitchFamily="18" charset="0"/>
+                                      <a:ea typeface="Cambria Math" panose="02040503050406030204" pitchFamily="18" charset="0"/>
+                                    </a:rPr>
+                                  </m:ctrlPr>
+                                </m:naryPr>
+                                <m:sub>
+                                  <m:r>
+                                    <m:rPr>
+                                      <m:brk m:alnAt="7"/>
+                                    </m:rPr>
+                                    <a:rPr lang="en-US" i="1">
+                                      <a:latin typeface="Cambria Math" panose="02040503050406030204" pitchFamily="18" charset="0"/>
+                                      <a:ea typeface="Cambria Math" panose="02040503050406030204" pitchFamily="18" charset="0"/>
+                                    </a:rPr>
+                                    <m:t>𝑖</m:t>
+                                  </m:r>
+                                </m:sub>
+                                <m:sup/>
+                                <m:e>
+                                  <m:sSubSup>
+                                    <m:sSubSupPr>
+                                      <m:ctrlPr>
+                                        <a:rPr lang="en-US" i="1">
+                                          <a:latin typeface="Cambria Math" panose="02040503050406030204" pitchFamily="18" charset="0"/>
+                                          <a:ea typeface="Cambria Math" panose="02040503050406030204" pitchFamily="18" charset="0"/>
+                                        </a:rPr>
+                                      </m:ctrlPr>
+                                    </m:sSubSupPr>
+                                    <m:e>
+                                      <m:r>
+                                        <a:rPr lang="en-US" i="1">
+                                          <a:latin typeface="Cambria Math" panose="02040503050406030204" pitchFamily="18" charset="0"/>
+                                          <a:ea typeface="Cambria Math" panose="02040503050406030204" pitchFamily="18" charset="0"/>
+                                        </a:rPr>
+                                        <m:t>𝑠</m:t>
+                                      </m:r>
+                                    </m:e>
+                                    <m:sub>
+                                      <m:r>
+                                        <a:rPr lang="en-US" i="1">
+                                          <a:latin typeface="Cambria Math" panose="02040503050406030204" pitchFamily="18" charset="0"/>
+                                          <a:ea typeface="Cambria Math" panose="02040503050406030204" pitchFamily="18" charset="0"/>
+                                        </a:rPr>
+                                        <m:t>𝑖</m:t>
+                                      </m:r>
+                                    </m:sub>
+                                    <m:sup>
+                                      <m:r>
+                                        <a:rPr lang="en-US" i="1">
+                                          <a:latin typeface="Cambria Math" panose="02040503050406030204" pitchFamily="18" charset="0"/>
+                                          <a:ea typeface="Cambria Math" panose="02040503050406030204" pitchFamily="18" charset="0"/>
+                                        </a:rPr>
+                                        <m:t>2</m:t>
+                                      </m:r>
+                                    </m:sup>
+                                  </m:sSubSup>
+                                </m:e>
+                              </m:nary>
+                            </m:e>
+                          </m:d>
                         </m:e>
                       </m:func>
                       <m:r>
                         <a:rPr lang="en-US" b="0" i="1" smtClean="0">
                           <a:latin typeface="Cambria Math" panose="02040503050406030204" pitchFamily="18" charset="0"/>
                         </a:rPr>
-                        <m:t>−</m:t>
-                      </m:r>
-                      <m:r>
-                        <a:rPr lang="en-US" b="0" i="1" smtClean="0">
-                          <a:latin typeface="Cambria Math" panose="02040503050406030204" pitchFamily="18" charset="0"/>
-                          <a:ea typeface="Cambria Math" panose="02040503050406030204" pitchFamily="18" charset="0"/>
-                        </a:rPr>
-                        <m:t>𝜆</m:t>
-                      </m:r>
-                      <m:sSup>
-                        <m:sSupPr>
-                          <m:ctrlPr>
-                            <a:rPr lang="en-US" i="1">
-                              <a:latin typeface="Cambria Math" panose="02040503050406030204" pitchFamily="18" charset="0"/>
-                            </a:rPr>
-                          </m:ctrlPr>
-                        </m:sSupPr>
-                        <m:e>
-                          <m:r>
-                            <a:rPr lang="en-US" i="1">
-                              <a:latin typeface="Cambria Math" panose="02040503050406030204" pitchFamily="18" charset="0"/>
-                            </a:rPr>
-                            <m:t>𝑠</m:t>
-                          </m:r>
-                        </m:e>
-                        <m:sup>
-                          <m:r>
-                            <a:rPr lang="en-US" i="1">
-                              <a:latin typeface="Cambria Math" panose="02040503050406030204" pitchFamily="18" charset="0"/>
-                            </a:rPr>
-                            <m:t>𝑇</m:t>
-                          </m:r>
-                        </m:sup>
-                      </m:sSup>
-                      <m:r>
-                        <a:rPr lang="en-US" i="1">
-                          <a:latin typeface="Cambria Math" panose="02040503050406030204" pitchFamily="18" charset="0"/>
-                        </a:rPr>
-                        <m:t>𝑠</m:t>
+                        <m:t>, </m:t>
                       </m:r>
                       <m:r>
                         <a:rPr lang="en-US" b="0" i="1" smtClean="0">
                           <a:latin typeface="Cambria Math" panose="02040503050406030204" pitchFamily="18" charset="0"/>
                         </a:rPr>
-                        <m:t>,  </m:t>
+                        <m:t> </m:t>
                       </m:r>
                       <m:r>
                         <a:rPr lang="en-US" b="0" i="1" smtClean="0">
@@ -38086,7 +37990,7 @@
               <a:blipFill>
                 <a:blip r:embed="rId2"/>
                 <a:stretch>
-                  <a:fillRect l="-1016" t="-1788"/>
+                  <a:fillRect l="-1016" t="-2905"/>
                 </a:stretch>
               </a:blipFill>
             </p:spPr>
@@ -42943,8 +42847,8 @@
           </a:p>
         </p:txBody>
       </p:sp>
-      <mc:AlternateContent xmlns:mc="http://schemas.openxmlformats.org/markup-compatibility/2006" xmlns:a14="http://schemas.microsoft.com/office/drawing/2010/main">
-        <mc:Choice Requires="a14">
+      <mc:AlternateContent xmlns:mc="http://schemas.openxmlformats.org/markup-compatibility/2006">
+        <mc:Choice xmlns:a14="http://schemas.microsoft.com/office/drawing/2010/main" Requires="a14">
           <p:sp>
             <p:nvSpPr>
               <p:cNvPr id="3" name="Content Placeholder 2">
@@ -43048,7 +42952,7 @@
                 </a:r>
                 <a:r>
                   <a:rPr lang="en-US" dirty="0"/>
-                  <a:t>is the average distance from a node to all other nodes in a graph component </a:t>
+                  <a:t>is the average inverse distance from a node to all other nodes in a graph component </a:t>
                 </a:r>
               </a:p>
               <a:p>
@@ -43136,7 +43040,7 @@
             </p:txBody>
           </p:sp>
         </mc:Choice>
-        <mc:Fallback xmlns="">
+        <mc:Fallback>
           <p:sp>
             <p:nvSpPr>
               <p:cNvPr id="3" name="Content Placeholder 2">
@@ -43161,7 +43065,7 @@
               <a:blipFill>
                 <a:blip r:embed="rId2"/>
                 <a:stretch>
-                  <a:fillRect l="-1159" t="-2461" r="-348"/>
+                  <a:fillRect l="-1159" t="-2461"/>
                 </a:stretch>
               </a:blipFill>
             </p:spPr>

</xml_diff>